<commit_message>
Add slides to all script
</commit_message>
<xml_diff>
--- a/2017/02/Tarantool for windows applications/Presentation.pptx
+++ b/2017/02/Tarantool for windows applications/Presentation.pptx
@@ -5,7 +5,7 @@
     <p:sldMasterId id="2147483648" r:id="rId1"/>
   </p:sldMasterIdLst>
   <p:notesMasterIdLst>
-    <p:notesMasterId r:id="rId13"/>
+    <p:notesMasterId r:id="rId15"/>
   </p:notesMasterIdLst>
   <p:sldIdLst>
     <p:sldId id="256" r:id="rId2"/>
@@ -19,6 +19,8 @@
     <p:sldId id="264" r:id="rId10"/>
     <p:sldId id="265" r:id="rId11"/>
     <p:sldId id="266" r:id="rId12"/>
+    <p:sldId id="267" r:id="rId13"/>
+    <p:sldId id="268" r:id="rId14"/>
   </p:sldIdLst>
   <p:sldSz cx="12192000" cy="6858000"/>
   <p:notesSz cx="6858000" cy="9144000"/>
@@ -207,7 +209,7 @@
           <a:p>
             <a:fld id="{AA141E3B-D5A7-E249-8915-F3F967F6417F}" type="datetimeFigureOut">
               <a:rPr lang="en-US" smtClean="0"/>
-              <a:t>2/8/17</a:t>
+              <a:t>2/9/17</a:t>
             </a:fld>
             <a:endParaRPr lang="en-US"/>
           </a:p>
@@ -1681,7 +1683,7 @@
           <a:p>
             <a:fld id="{EB0D839A-7E39-2C46-8BD6-3DA56612CC53}" type="datetimeFigureOut">
               <a:rPr lang="en-US" smtClean="0"/>
-              <a:t>2/8/17</a:t>
+              <a:t>2/9/17</a:t>
             </a:fld>
             <a:endParaRPr lang="en-US"/>
           </a:p>
@@ -1851,7 +1853,7 @@
           <a:p>
             <a:fld id="{EB0D839A-7E39-2C46-8BD6-3DA56612CC53}" type="datetimeFigureOut">
               <a:rPr lang="en-US" smtClean="0"/>
-              <a:t>2/8/17</a:t>
+              <a:t>2/9/17</a:t>
             </a:fld>
             <a:endParaRPr lang="en-US"/>
           </a:p>
@@ -2031,7 +2033,7 @@
           <a:p>
             <a:fld id="{EB0D839A-7E39-2C46-8BD6-3DA56612CC53}" type="datetimeFigureOut">
               <a:rPr lang="en-US" smtClean="0"/>
-              <a:t>2/8/17</a:t>
+              <a:t>2/9/17</a:t>
             </a:fld>
             <a:endParaRPr lang="en-US"/>
           </a:p>
@@ -2201,7 +2203,7 @@
           <a:p>
             <a:fld id="{EB0D839A-7E39-2C46-8BD6-3DA56612CC53}" type="datetimeFigureOut">
               <a:rPr lang="en-US" smtClean="0"/>
-              <a:t>2/8/17</a:t>
+              <a:t>2/9/17</a:t>
             </a:fld>
             <a:endParaRPr lang="en-US"/>
           </a:p>
@@ -2447,7 +2449,7 @@
           <a:p>
             <a:fld id="{EB0D839A-7E39-2C46-8BD6-3DA56612CC53}" type="datetimeFigureOut">
               <a:rPr lang="en-US" smtClean="0"/>
-              <a:t>2/8/17</a:t>
+              <a:t>2/9/17</a:t>
             </a:fld>
             <a:endParaRPr lang="en-US"/>
           </a:p>
@@ -2679,7 +2681,7 @@
           <a:p>
             <a:fld id="{EB0D839A-7E39-2C46-8BD6-3DA56612CC53}" type="datetimeFigureOut">
               <a:rPr lang="en-US" smtClean="0"/>
-              <a:t>2/8/17</a:t>
+              <a:t>2/9/17</a:t>
             </a:fld>
             <a:endParaRPr lang="en-US"/>
           </a:p>
@@ -3046,7 +3048,7 @@
           <a:p>
             <a:fld id="{EB0D839A-7E39-2C46-8BD6-3DA56612CC53}" type="datetimeFigureOut">
               <a:rPr lang="en-US" smtClean="0"/>
-              <a:t>2/8/17</a:t>
+              <a:t>2/9/17</a:t>
             </a:fld>
             <a:endParaRPr lang="en-US"/>
           </a:p>
@@ -3164,7 +3166,7 @@
           <a:p>
             <a:fld id="{EB0D839A-7E39-2C46-8BD6-3DA56612CC53}" type="datetimeFigureOut">
               <a:rPr lang="en-US" smtClean="0"/>
-              <a:t>2/8/17</a:t>
+              <a:t>2/9/17</a:t>
             </a:fld>
             <a:endParaRPr lang="en-US"/>
           </a:p>
@@ -3259,7 +3261,7 @@
           <a:p>
             <a:fld id="{EB0D839A-7E39-2C46-8BD6-3DA56612CC53}" type="datetimeFigureOut">
               <a:rPr lang="en-US" smtClean="0"/>
-              <a:t>2/8/17</a:t>
+              <a:t>2/9/17</a:t>
             </a:fld>
             <a:endParaRPr lang="en-US"/>
           </a:p>
@@ -3536,7 +3538,7 @@
           <a:p>
             <a:fld id="{EB0D839A-7E39-2C46-8BD6-3DA56612CC53}" type="datetimeFigureOut">
               <a:rPr lang="en-US" smtClean="0"/>
-              <a:t>2/8/17</a:t>
+              <a:t>2/9/17</a:t>
             </a:fld>
             <a:endParaRPr lang="en-US"/>
           </a:p>
@@ -3789,7 +3791,7 @@
           <a:p>
             <a:fld id="{EB0D839A-7E39-2C46-8BD6-3DA56612CC53}" type="datetimeFigureOut">
               <a:rPr lang="en-US" smtClean="0"/>
-              <a:t>2/8/17</a:t>
+              <a:t>2/9/17</a:t>
             </a:fld>
             <a:endParaRPr lang="en-US"/>
           </a:p>
@@ -4002,7 +4004,7 @@
           <a:p>
             <a:fld id="{EB0D839A-7E39-2C46-8BD6-3DA56612CC53}" type="datetimeFigureOut">
               <a:rPr lang="en-US" smtClean="0"/>
-              <a:t>2/8/17</a:t>
+              <a:t>2/9/17</a:t>
             </a:fld>
             <a:endParaRPr lang="en-US"/>
           </a:p>
@@ -5000,47 +5002,28 @@
           <a:p>
             <a:r>
               <a:rPr lang="ru-RU" dirty="0" smtClean="0"/>
-              <a:t>Специфический язык запросов. </a:t>
-            </a:r>
-            <a:r>
-              <a:rPr lang="en-US" dirty="0" smtClean="0"/>
-              <a:t>QA </a:t>
-            </a:r>
+              <a:t>Скорость.</a:t>
+            </a:r>
+            <a:endParaRPr lang="ru-RU" dirty="0"/>
+          </a:p>
+          <a:p>
+            <a:endParaRPr lang="ru-RU" dirty="0" smtClean="0"/>
+          </a:p>
+          <a:p>
             <a:r>
               <a:rPr lang="ru-RU" dirty="0" smtClean="0"/>
-              <a:t>и </a:t>
-            </a:r>
-            <a:r>
-              <a:rPr lang="en-US" dirty="0" smtClean="0"/>
-              <a:t>Ops </a:t>
-            </a:r>
+              <a:t>Надёжность записи на диск.</a:t>
+            </a:r>
+          </a:p>
+          <a:p>
+            <a:endParaRPr lang="ru-RU" dirty="0" smtClean="0"/>
+          </a:p>
+          <a:p>
             <a:r>
               <a:rPr lang="ru-RU" dirty="0" smtClean="0"/>
-              <a:t>страдают.</a:t>
+              <a:t>Вторичные индексы.</a:t>
             </a:r>
             <a:endParaRPr lang="en-US" dirty="0" smtClean="0"/>
-          </a:p>
-          <a:p>
-            <a:endParaRPr lang="ru-RU" dirty="0" smtClean="0"/>
-          </a:p>
-          <a:p>
-            <a:r>
-              <a:rPr lang="ru-RU" dirty="0" smtClean="0"/>
-              <a:t>Ждём </a:t>
-            </a:r>
-            <a:r>
-              <a:rPr lang="en-US" dirty="0" err="1" smtClean="0"/>
-              <a:t>sql</a:t>
-            </a:r>
-            <a:r>
-              <a:rPr lang="en-US" dirty="0" smtClean="0"/>
-              <a:t>. </a:t>
-            </a:r>
-            <a:r>
-              <a:rPr lang="ru-RU" smtClean="0"/>
-              <a:t>Вроде как в 1.8.</a:t>
-            </a:r>
-            <a:endParaRPr lang="en-US" dirty="0"/>
           </a:p>
         </p:txBody>
       </p:sp>
@@ -5048,6 +5031,569 @@
     <p:extLst>
       <p:ext uri="{BB962C8B-B14F-4D97-AF65-F5344CB8AC3E}">
         <p14:creationId xmlns:p14="http://schemas.microsoft.com/office/powerpoint/2010/main" val="3331560"/>
+      </p:ext>
+    </p:extLst>
+  </p:cSld>
+  <p:clrMapOvr>
+    <a:masterClrMapping/>
+  </p:clrMapOvr>
+  <p:timing>
+    <p:tnLst>
+      <p:par>
+        <p:cTn id="1" dur="indefinite" restart="never" nodeType="tmRoot">
+          <p:childTnLst>
+            <p:seq concurrent="1" nextAc="seek">
+              <p:cTn id="2" dur="indefinite" nodeType="mainSeq">
+                <p:childTnLst>
+                  <p:par>
+                    <p:cTn id="3" fill="hold">
+                      <p:stCondLst>
+                        <p:cond delay="indefinite"/>
+                      </p:stCondLst>
+                      <p:childTnLst>
+                        <p:par>
+                          <p:cTn id="4" fill="hold">
+                            <p:stCondLst>
+                              <p:cond delay="0"/>
+                            </p:stCondLst>
+                            <p:childTnLst>
+                              <p:par>
+                                <p:cTn id="5" presetID="1" presetClass="entr" presetSubtype="0" fill="hold" nodeType="clickEffect">
+                                  <p:stCondLst>
+                                    <p:cond delay="0"/>
+                                  </p:stCondLst>
+                                  <p:childTnLst>
+                                    <p:set>
+                                      <p:cBhvr>
+                                        <p:cTn id="6" dur="1" fill="hold">
+                                          <p:stCondLst>
+                                            <p:cond delay="0"/>
+                                          </p:stCondLst>
+                                        </p:cTn>
+                                        <p:tgtEl>
+                                          <p:spTgt spid="3">
+                                            <p:txEl>
+                                              <p:pRg st="0" end="0"/>
+                                            </p:txEl>
+                                          </p:spTgt>
+                                        </p:tgtEl>
+                                        <p:attrNameLst>
+                                          <p:attrName>style.visibility</p:attrName>
+                                        </p:attrNameLst>
+                                      </p:cBhvr>
+                                      <p:to>
+                                        <p:strVal val="visible"/>
+                                      </p:to>
+                                    </p:set>
+                                  </p:childTnLst>
+                                </p:cTn>
+                              </p:par>
+                            </p:childTnLst>
+                          </p:cTn>
+                        </p:par>
+                      </p:childTnLst>
+                    </p:cTn>
+                  </p:par>
+                  <p:par>
+                    <p:cTn id="7" fill="hold">
+                      <p:stCondLst>
+                        <p:cond delay="indefinite"/>
+                      </p:stCondLst>
+                      <p:childTnLst>
+                        <p:par>
+                          <p:cTn id="8" fill="hold">
+                            <p:stCondLst>
+                              <p:cond delay="0"/>
+                            </p:stCondLst>
+                            <p:childTnLst>
+                              <p:par>
+                                <p:cTn id="9" presetID="1" presetClass="entr" presetSubtype="0" fill="hold" nodeType="clickEffect">
+                                  <p:stCondLst>
+                                    <p:cond delay="0"/>
+                                  </p:stCondLst>
+                                  <p:childTnLst>
+                                    <p:set>
+                                      <p:cBhvr>
+                                        <p:cTn id="10" dur="1" fill="hold">
+                                          <p:stCondLst>
+                                            <p:cond delay="0"/>
+                                          </p:stCondLst>
+                                        </p:cTn>
+                                        <p:tgtEl>
+                                          <p:spTgt spid="3">
+                                            <p:txEl>
+                                              <p:pRg st="2" end="2"/>
+                                            </p:txEl>
+                                          </p:spTgt>
+                                        </p:tgtEl>
+                                        <p:attrNameLst>
+                                          <p:attrName>style.visibility</p:attrName>
+                                        </p:attrNameLst>
+                                      </p:cBhvr>
+                                      <p:to>
+                                        <p:strVal val="visible"/>
+                                      </p:to>
+                                    </p:set>
+                                  </p:childTnLst>
+                                </p:cTn>
+                              </p:par>
+                            </p:childTnLst>
+                          </p:cTn>
+                        </p:par>
+                      </p:childTnLst>
+                    </p:cTn>
+                  </p:par>
+                  <p:par>
+                    <p:cTn id="11" fill="hold">
+                      <p:stCondLst>
+                        <p:cond delay="indefinite"/>
+                      </p:stCondLst>
+                      <p:childTnLst>
+                        <p:par>
+                          <p:cTn id="12" fill="hold">
+                            <p:stCondLst>
+                              <p:cond delay="0"/>
+                            </p:stCondLst>
+                            <p:childTnLst>
+                              <p:par>
+                                <p:cTn id="13" presetID="1" presetClass="entr" presetSubtype="0" fill="hold" nodeType="clickEffect">
+                                  <p:stCondLst>
+                                    <p:cond delay="0"/>
+                                  </p:stCondLst>
+                                  <p:childTnLst>
+                                    <p:set>
+                                      <p:cBhvr>
+                                        <p:cTn id="14" dur="1" fill="hold">
+                                          <p:stCondLst>
+                                            <p:cond delay="0"/>
+                                          </p:stCondLst>
+                                        </p:cTn>
+                                        <p:tgtEl>
+                                          <p:spTgt spid="3">
+                                            <p:txEl>
+                                              <p:pRg st="4" end="4"/>
+                                            </p:txEl>
+                                          </p:spTgt>
+                                        </p:tgtEl>
+                                        <p:attrNameLst>
+                                          <p:attrName>style.visibility</p:attrName>
+                                        </p:attrNameLst>
+                                      </p:cBhvr>
+                                      <p:to>
+                                        <p:strVal val="visible"/>
+                                      </p:to>
+                                    </p:set>
+                                  </p:childTnLst>
+                                </p:cTn>
+                              </p:par>
+                            </p:childTnLst>
+                          </p:cTn>
+                        </p:par>
+                      </p:childTnLst>
+                    </p:cTn>
+                  </p:par>
+                </p:childTnLst>
+              </p:cTn>
+              <p:prevCondLst>
+                <p:cond evt="onPrev" delay="0">
+                  <p:tgtEl>
+                    <p:sldTgt/>
+                  </p:tgtEl>
+                </p:cond>
+              </p:prevCondLst>
+              <p:nextCondLst>
+                <p:cond evt="onNext" delay="0">
+                  <p:tgtEl>
+                    <p:sldTgt/>
+                  </p:tgtEl>
+                </p:cond>
+              </p:nextCondLst>
+            </p:seq>
+          </p:childTnLst>
+        </p:cTn>
+      </p:par>
+    </p:tnLst>
+  </p:timing>
+</p:sld>
+</file>
+
+<file path=ppt/slides/slide12.xml><?xml version="1.0" encoding="utf-8"?>
+<p:sld xmlns:a="http://schemas.openxmlformats.org/drawingml/2006/main" xmlns:r="http://schemas.openxmlformats.org/officeDocument/2006/relationships" xmlns:p="http://schemas.openxmlformats.org/presentationml/2006/main">
+  <p:cSld>
+    <p:spTree>
+      <p:nvGrpSpPr>
+        <p:cNvPr id="1" name=""/>
+        <p:cNvGrpSpPr/>
+        <p:nvPr/>
+      </p:nvGrpSpPr>
+      <p:grpSpPr>
+        <a:xfrm>
+          <a:off x="0" y="0"/>
+          <a:ext cx="0" cy="0"/>
+          <a:chOff x="0" y="0"/>
+          <a:chExt cx="0" cy="0"/>
+        </a:xfrm>
+      </p:grpSpPr>
+      <p:sp>
+        <p:nvSpPr>
+          <p:cNvPr id="2" name="Title 1"/>
+          <p:cNvSpPr>
+            <a:spLocks noGrp="1"/>
+          </p:cNvSpPr>
+          <p:nvPr>
+            <p:ph type="title"/>
+          </p:nvPr>
+        </p:nvSpPr>
+        <p:spPr/>
+        <p:txBody>
+          <a:bodyPr/>
+          <a:lstStyle/>
+          <a:p>
+            <a:r>
+              <a:rPr lang="ru-RU" smtClean="0"/>
+              <a:t>Достоинства</a:t>
+            </a:r>
+            <a:endParaRPr lang="en-US" dirty="0"/>
+          </a:p>
+        </p:txBody>
+      </p:sp>
+      <p:sp>
+        <p:nvSpPr>
+          <p:cNvPr id="3" name="Content Placeholder 2"/>
+          <p:cNvSpPr>
+            <a:spLocks noGrp="1"/>
+          </p:cNvSpPr>
+          <p:nvPr>
+            <p:ph idx="1"/>
+          </p:nvPr>
+        </p:nvSpPr>
+        <p:spPr/>
+        <p:txBody>
+          <a:bodyPr/>
+          <a:lstStyle/>
+          <a:p>
+            <a:r>
+              <a:rPr lang="ru-RU" dirty="0" smtClean="0"/>
+              <a:t>Нет </a:t>
+            </a:r>
+            <a:r>
+              <a:rPr lang="en-US" dirty="0" smtClean="0"/>
+              <a:t>Windows-binary</a:t>
+            </a:r>
+            <a:r>
+              <a:rPr lang="ru-RU" dirty="0" smtClean="0"/>
+              <a:t>.</a:t>
+            </a:r>
+            <a:endParaRPr lang="ru-RU" dirty="0"/>
+          </a:p>
+          <a:p>
+            <a:endParaRPr lang="ru-RU" dirty="0" smtClean="0"/>
+          </a:p>
+          <a:p>
+            <a:r>
+              <a:rPr lang="ru-RU" dirty="0" smtClean="0"/>
+              <a:t>Унификация конфигурации для </a:t>
+            </a:r>
+            <a:r>
+              <a:rPr lang="en-US" dirty="0" smtClean="0"/>
+              <a:t>master-master </a:t>
+            </a:r>
+            <a:r>
+              <a:rPr lang="ru-RU" dirty="0" smtClean="0"/>
+              <a:t>конфигурации.</a:t>
+            </a:r>
+          </a:p>
+          <a:p>
+            <a:endParaRPr lang="ru-RU" dirty="0" smtClean="0"/>
+          </a:p>
+          <a:p>
+            <a:r>
+              <a:rPr lang="ru-RU" dirty="0" smtClean="0"/>
+              <a:t>Сервера приложений.</a:t>
+            </a:r>
+            <a:endParaRPr lang="en-US" dirty="0" smtClean="0"/>
+          </a:p>
+        </p:txBody>
+      </p:sp>
+    </p:spTree>
+    <p:extLst>
+      <p:ext uri="{BB962C8B-B14F-4D97-AF65-F5344CB8AC3E}">
+        <p14:creationId xmlns:p14="http://schemas.microsoft.com/office/powerpoint/2010/main" val="1652160605"/>
+      </p:ext>
+    </p:extLst>
+  </p:cSld>
+  <p:clrMapOvr>
+    <a:masterClrMapping/>
+  </p:clrMapOvr>
+  <p:timing>
+    <p:tnLst>
+      <p:par>
+        <p:cTn id="1" dur="indefinite" restart="never" nodeType="tmRoot">
+          <p:childTnLst>
+            <p:seq concurrent="1" nextAc="seek">
+              <p:cTn id="2" dur="indefinite" nodeType="mainSeq">
+                <p:childTnLst>
+                  <p:par>
+                    <p:cTn id="3" fill="hold">
+                      <p:stCondLst>
+                        <p:cond delay="indefinite"/>
+                      </p:stCondLst>
+                      <p:childTnLst>
+                        <p:par>
+                          <p:cTn id="4" fill="hold">
+                            <p:stCondLst>
+                              <p:cond delay="0"/>
+                            </p:stCondLst>
+                            <p:childTnLst>
+                              <p:par>
+                                <p:cTn id="5" presetID="1" presetClass="entr" presetSubtype="0" fill="hold" nodeType="clickEffect">
+                                  <p:stCondLst>
+                                    <p:cond delay="0"/>
+                                  </p:stCondLst>
+                                  <p:childTnLst>
+                                    <p:set>
+                                      <p:cBhvr>
+                                        <p:cTn id="6" dur="1" fill="hold">
+                                          <p:stCondLst>
+                                            <p:cond delay="0"/>
+                                          </p:stCondLst>
+                                        </p:cTn>
+                                        <p:tgtEl>
+                                          <p:spTgt spid="3">
+                                            <p:txEl>
+                                              <p:pRg st="0" end="0"/>
+                                            </p:txEl>
+                                          </p:spTgt>
+                                        </p:tgtEl>
+                                        <p:attrNameLst>
+                                          <p:attrName>style.visibility</p:attrName>
+                                        </p:attrNameLst>
+                                      </p:cBhvr>
+                                      <p:to>
+                                        <p:strVal val="visible"/>
+                                      </p:to>
+                                    </p:set>
+                                  </p:childTnLst>
+                                </p:cTn>
+                              </p:par>
+                            </p:childTnLst>
+                          </p:cTn>
+                        </p:par>
+                      </p:childTnLst>
+                    </p:cTn>
+                  </p:par>
+                  <p:par>
+                    <p:cTn id="7" fill="hold">
+                      <p:stCondLst>
+                        <p:cond delay="indefinite"/>
+                      </p:stCondLst>
+                      <p:childTnLst>
+                        <p:par>
+                          <p:cTn id="8" fill="hold">
+                            <p:stCondLst>
+                              <p:cond delay="0"/>
+                            </p:stCondLst>
+                            <p:childTnLst>
+                              <p:par>
+                                <p:cTn id="9" presetID="1" presetClass="entr" presetSubtype="0" fill="hold" nodeType="clickEffect">
+                                  <p:stCondLst>
+                                    <p:cond delay="0"/>
+                                  </p:stCondLst>
+                                  <p:childTnLst>
+                                    <p:set>
+                                      <p:cBhvr>
+                                        <p:cTn id="10" dur="1" fill="hold">
+                                          <p:stCondLst>
+                                            <p:cond delay="0"/>
+                                          </p:stCondLst>
+                                        </p:cTn>
+                                        <p:tgtEl>
+                                          <p:spTgt spid="3">
+                                            <p:txEl>
+                                              <p:pRg st="2" end="2"/>
+                                            </p:txEl>
+                                          </p:spTgt>
+                                        </p:tgtEl>
+                                        <p:attrNameLst>
+                                          <p:attrName>style.visibility</p:attrName>
+                                        </p:attrNameLst>
+                                      </p:cBhvr>
+                                      <p:to>
+                                        <p:strVal val="visible"/>
+                                      </p:to>
+                                    </p:set>
+                                  </p:childTnLst>
+                                </p:cTn>
+                              </p:par>
+                            </p:childTnLst>
+                          </p:cTn>
+                        </p:par>
+                      </p:childTnLst>
+                    </p:cTn>
+                  </p:par>
+                  <p:par>
+                    <p:cTn id="11" fill="hold">
+                      <p:stCondLst>
+                        <p:cond delay="indefinite"/>
+                      </p:stCondLst>
+                      <p:childTnLst>
+                        <p:par>
+                          <p:cTn id="12" fill="hold">
+                            <p:stCondLst>
+                              <p:cond delay="0"/>
+                            </p:stCondLst>
+                            <p:childTnLst>
+                              <p:par>
+                                <p:cTn id="13" presetID="1" presetClass="entr" presetSubtype="0" fill="hold" nodeType="clickEffect">
+                                  <p:stCondLst>
+                                    <p:cond delay="0"/>
+                                  </p:stCondLst>
+                                  <p:childTnLst>
+                                    <p:set>
+                                      <p:cBhvr>
+                                        <p:cTn id="14" dur="1" fill="hold">
+                                          <p:stCondLst>
+                                            <p:cond delay="0"/>
+                                          </p:stCondLst>
+                                        </p:cTn>
+                                        <p:tgtEl>
+                                          <p:spTgt spid="3">
+                                            <p:txEl>
+                                              <p:pRg st="4" end="4"/>
+                                            </p:txEl>
+                                          </p:spTgt>
+                                        </p:tgtEl>
+                                        <p:attrNameLst>
+                                          <p:attrName>style.visibility</p:attrName>
+                                        </p:attrNameLst>
+                                      </p:cBhvr>
+                                      <p:to>
+                                        <p:strVal val="visible"/>
+                                      </p:to>
+                                    </p:set>
+                                  </p:childTnLst>
+                                </p:cTn>
+                              </p:par>
+                            </p:childTnLst>
+                          </p:cTn>
+                        </p:par>
+                      </p:childTnLst>
+                    </p:cTn>
+                  </p:par>
+                </p:childTnLst>
+              </p:cTn>
+              <p:prevCondLst>
+                <p:cond evt="onPrev" delay="0">
+                  <p:tgtEl>
+                    <p:sldTgt/>
+                  </p:tgtEl>
+                </p:cond>
+              </p:prevCondLst>
+              <p:nextCondLst>
+                <p:cond evt="onNext" delay="0">
+                  <p:tgtEl>
+                    <p:sldTgt/>
+                  </p:tgtEl>
+                </p:cond>
+              </p:nextCondLst>
+            </p:seq>
+          </p:childTnLst>
+        </p:cTn>
+      </p:par>
+    </p:tnLst>
+  </p:timing>
+</p:sld>
+</file>
+
+<file path=ppt/slides/slide13.xml><?xml version="1.0" encoding="utf-8"?>
+<p:sld xmlns:a="http://schemas.openxmlformats.org/drawingml/2006/main" xmlns:r="http://schemas.openxmlformats.org/officeDocument/2006/relationships" xmlns:p="http://schemas.openxmlformats.org/presentationml/2006/main">
+  <p:cSld>
+    <p:spTree>
+      <p:nvGrpSpPr>
+        <p:cNvPr id="1" name=""/>
+        <p:cNvGrpSpPr/>
+        <p:nvPr/>
+      </p:nvGrpSpPr>
+      <p:grpSpPr>
+        <a:xfrm>
+          <a:off x="0" y="0"/>
+          <a:ext cx="0" cy="0"/>
+          <a:chOff x="0" y="0"/>
+          <a:chExt cx="0" cy="0"/>
+        </a:xfrm>
+      </p:grpSpPr>
+      <p:sp>
+        <p:nvSpPr>
+          <p:cNvPr id="2" name="Title 1"/>
+          <p:cNvSpPr>
+            <a:spLocks noGrp="1"/>
+          </p:cNvSpPr>
+          <p:nvPr>
+            <p:ph type="title"/>
+          </p:nvPr>
+        </p:nvSpPr>
+        <p:spPr/>
+        <p:txBody>
+          <a:bodyPr/>
+          <a:lstStyle/>
+          <a:p>
+            <a:r>
+              <a:rPr lang="ru-RU" smtClean="0"/>
+              <a:t>Достоинства</a:t>
+            </a:r>
+            <a:endParaRPr lang="en-US" dirty="0"/>
+          </a:p>
+        </p:txBody>
+      </p:sp>
+      <p:sp>
+        <p:nvSpPr>
+          <p:cNvPr id="3" name="Content Placeholder 2"/>
+          <p:cNvSpPr>
+            <a:spLocks noGrp="1"/>
+          </p:cNvSpPr>
+          <p:nvPr>
+            <p:ph idx="1"/>
+          </p:nvPr>
+        </p:nvSpPr>
+        <p:spPr/>
+        <p:txBody>
+          <a:bodyPr/>
+          <a:lstStyle/>
+          <a:p>
+            <a:r>
+              <a:rPr lang="en-US" dirty="0" smtClean="0"/>
+              <a:t>Read recovery via </a:t>
+            </a:r>
+            <a:r>
+              <a:rPr lang="en-US" dirty="0" err="1" smtClean="0"/>
+              <a:t>Lua</a:t>
+            </a:r>
+            <a:r>
+              <a:rPr lang="ru-RU" dirty="0" smtClean="0"/>
+              <a:t>.</a:t>
+            </a:r>
+            <a:endParaRPr lang="ru-RU" dirty="0"/>
+          </a:p>
+          <a:p>
+            <a:endParaRPr lang="ru-RU" dirty="0" smtClean="0"/>
+          </a:p>
+          <a:p>
+            <a:r>
+              <a:rPr lang="ru-RU" smtClean="0"/>
+              <a:t>Разработчики</a:t>
+            </a:r>
+            <a:r>
+              <a:rPr lang="ru-RU" smtClean="0"/>
+              <a:t>.</a:t>
+            </a:r>
+            <a:endParaRPr lang="en-US" dirty="0" smtClean="0"/>
+          </a:p>
+        </p:txBody>
+      </p:sp>
+    </p:spTree>
+    <p:extLst>
+      <p:ext uri="{BB962C8B-B14F-4D97-AF65-F5344CB8AC3E}">
+        <p14:creationId xmlns:p14="http://schemas.microsoft.com/office/powerpoint/2010/main" val="1385280565"/>
       </p:ext>
     </p:extLst>
   </p:cSld>

</xml_diff>

<commit_message>
Initial draft of presentation
</commit_message>
<xml_diff>
--- a/2017/02/Tarantool for windows applications/Presentation.pptx
+++ b/2017/02/Tarantool for windows applications/Presentation.pptx
@@ -215,7 +215,7 @@
           <a:p>
             <a:fld id="{AA141E3B-D5A7-E249-8915-F3F967F6417F}" type="datetimeFigureOut">
               <a:rPr lang="en-US" smtClean="0"/>
-              <a:t>2/28/17</a:t>
+              <a:t>3/2/17</a:t>
             </a:fld>
             <a:endParaRPr lang="en-US"/>
           </a:p>
@@ -1474,11 +1474,7 @@
           <a:p>
             <a:r>
               <a:rPr lang="ru-RU" dirty="0" smtClean="0"/>
-              <a:t>Общий </a:t>
-            </a:r>
-            <a:r>
-              <a:rPr lang="ru-RU" dirty="0" smtClean="0"/>
-              <a:t>недостаток Редиса, Тарантула, </a:t>
+              <a:t>Общий недостаток Редиса, Тарантула, </a:t>
             </a:r>
             <a:r>
               <a:rPr lang="en-US" dirty="0" err="1" smtClean="0"/>
@@ -3787,7 +3783,7 @@
           <a:p>
             <a:fld id="{EB0D839A-7E39-2C46-8BD6-3DA56612CC53}" type="datetimeFigureOut">
               <a:rPr lang="en-US" smtClean="0"/>
-              <a:t>2/28/17</a:t>
+              <a:t>3/2/17</a:t>
             </a:fld>
             <a:endParaRPr lang="en-US"/>
           </a:p>
@@ -3957,7 +3953,7 @@
           <a:p>
             <a:fld id="{EB0D839A-7E39-2C46-8BD6-3DA56612CC53}" type="datetimeFigureOut">
               <a:rPr lang="en-US" smtClean="0"/>
-              <a:t>2/28/17</a:t>
+              <a:t>3/2/17</a:t>
             </a:fld>
             <a:endParaRPr lang="en-US"/>
           </a:p>
@@ -4137,7 +4133,7 @@
           <a:p>
             <a:fld id="{EB0D839A-7E39-2C46-8BD6-3DA56612CC53}" type="datetimeFigureOut">
               <a:rPr lang="en-US" smtClean="0"/>
-              <a:t>2/28/17</a:t>
+              <a:t>3/2/17</a:t>
             </a:fld>
             <a:endParaRPr lang="en-US"/>
           </a:p>
@@ -4307,7 +4303,7 @@
           <a:p>
             <a:fld id="{EB0D839A-7E39-2C46-8BD6-3DA56612CC53}" type="datetimeFigureOut">
               <a:rPr lang="en-US" smtClean="0"/>
-              <a:t>2/28/17</a:t>
+              <a:t>3/2/17</a:t>
             </a:fld>
             <a:endParaRPr lang="en-US"/>
           </a:p>
@@ -4553,7 +4549,7 @@
           <a:p>
             <a:fld id="{EB0D839A-7E39-2C46-8BD6-3DA56612CC53}" type="datetimeFigureOut">
               <a:rPr lang="en-US" smtClean="0"/>
-              <a:t>2/28/17</a:t>
+              <a:t>3/2/17</a:t>
             </a:fld>
             <a:endParaRPr lang="en-US"/>
           </a:p>
@@ -4785,7 +4781,7 @@
           <a:p>
             <a:fld id="{EB0D839A-7E39-2C46-8BD6-3DA56612CC53}" type="datetimeFigureOut">
               <a:rPr lang="en-US" smtClean="0"/>
-              <a:t>2/28/17</a:t>
+              <a:t>3/2/17</a:t>
             </a:fld>
             <a:endParaRPr lang="en-US"/>
           </a:p>
@@ -5152,7 +5148,7 @@
           <a:p>
             <a:fld id="{EB0D839A-7E39-2C46-8BD6-3DA56612CC53}" type="datetimeFigureOut">
               <a:rPr lang="en-US" smtClean="0"/>
-              <a:t>2/28/17</a:t>
+              <a:t>3/2/17</a:t>
             </a:fld>
             <a:endParaRPr lang="en-US"/>
           </a:p>
@@ -5270,7 +5266,7 @@
           <a:p>
             <a:fld id="{EB0D839A-7E39-2C46-8BD6-3DA56612CC53}" type="datetimeFigureOut">
               <a:rPr lang="en-US" smtClean="0"/>
-              <a:t>2/28/17</a:t>
+              <a:t>3/2/17</a:t>
             </a:fld>
             <a:endParaRPr lang="en-US"/>
           </a:p>
@@ -5365,7 +5361,7 @@
           <a:p>
             <a:fld id="{EB0D839A-7E39-2C46-8BD6-3DA56612CC53}" type="datetimeFigureOut">
               <a:rPr lang="en-US" smtClean="0"/>
-              <a:t>2/28/17</a:t>
+              <a:t>3/2/17</a:t>
             </a:fld>
             <a:endParaRPr lang="en-US"/>
           </a:p>
@@ -5642,7 +5638,7 @@
           <a:p>
             <a:fld id="{EB0D839A-7E39-2C46-8BD6-3DA56612CC53}" type="datetimeFigureOut">
               <a:rPr lang="en-US" smtClean="0"/>
-              <a:t>2/28/17</a:t>
+              <a:t>3/2/17</a:t>
             </a:fld>
             <a:endParaRPr lang="en-US"/>
           </a:p>
@@ -5895,7 +5891,7 @@
           <a:p>
             <a:fld id="{EB0D839A-7E39-2C46-8BD6-3DA56612CC53}" type="datetimeFigureOut">
               <a:rPr lang="en-US" smtClean="0"/>
-              <a:t>2/28/17</a:t>
+              <a:t>3/2/17</a:t>
             </a:fld>
             <a:endParaRPr lang="en-US"/>
           </a:p>
@@ -6108,7 +6104,7 @@
           <a:p>
             <a:fld id="{EB0D839A-7E39-2C46-8BD6-3DA56612CC53}" type="datetimeFigureOut">
               <a:rPr lang="en-US" smtClean="0"/>
-              <a:t>2/28/17</a:t>
+              <a:t>3/2/17</a:t>
             </a:fld>
             <a:endParaRPr lang="en-US"/>
           </a:p>
@@ -8643,11 +8639,7 @@
           <a:p>
             <a:r>
               <a:rPr lang="ru-RU" dirty="0" smtClean="0"/>
-              <a:t>Специфический </a:t>
-            </a:r>
-            <a:r>
-              <a:rPr lang="ru-RU" dirty="0" smtClean="0"/>
-              <a:t>язык запросов. </a:t>
+              <a:t>Специфический язык запросов. </a:t>
             </a:r>
             <a:r>
               <a:rPr lang="en-US" dirty="0" smtClean="0"/>
@@ -9037,11 +9029,7 @@
             </a:r>
             <a:r>
               <a:rPr lang="en-US" smtClean="0"/>
-              <a:t>Linux</a:t>
-            </a:r>
-            <a:r>
-              <a:rPr lang="en-US" smtClean="0"/>
-              <a:t>, </a:t>
+              <a:t>Linux, </a:t>
             </a:r>
             <a:r>
               <a:rPr lang="en-US" dirty="0" smtClean="0"/>
@@ -9965,11 +9953,7 @@
           <a:p>
             <a:r>
               <a:rPr lang="ru-RU" dirty="0" smtClean="0"/>
-              <a:t>Прекрасная </a:t>
-            </a:r>
-            <a:r>
-              <a:rPr lang="ru-RU" dirty="0" smtClean="0"/>
-              <a:t>документация</a:t>
+              <a:t>Прекрасная документация</a:t>
             </a:r>
           </a:p>
           <a:p>
@@ -10413,6 +10397,9 @@
                     <p:cTn id="3" fill="hold">
                       <p:stCondLst>
                         <p:cond delay="indefinite"/>
+                        <p:cond evt="onBegin" delay="0">
+                          <p:tn val="2"/>
+                        </p:cond>
                       </p:stCondLst>
                       <p:childTnLst>
                         <p:par>
@@ -10422,7 +10409,7 @@
                             </p:stCondLst>
                             <p:childTnLst>
                               <p:par>
-                                <p:cTn id="5" presetID="1" presetClass="entr" presetSubtype="0" fill="hold" nodeType="clickEffect">
+                                <p:cTn id="5" presetID="1" presetClass="entr" presetSubtype="0" fill="hold" nodeType="withEffect">
                                   <p:stCondLst>
                                     <p:cond delay="0"/>
                                   </p:stCondLst>
@@ -10435,11 +10422,7 @@
                                           </p:stCondLst>
                                         </p:cTn>
                                         <p:tgtEl>
-                                          <p:spTgt spid="3">
-                                            <p:txEl>
-                                              <p:pRg st="0" end="0"/>
-                                            </p:txEl>
-                                          </p:spTgt>
+                                          <p:spTgt spid="4"/>
                                         </p:tgtEl>
                                         <p:attrNameLst>
                                           <p:attrName>style.visibility</p:attrName>
@@ -10486,7 +10469,7 @@
                                         <p:tgtEl>
                                           <p:spTgt spid="3">
                                             <p:txEl>
-                                              <p:pRg st="2" end="2"/>
+                                              <p:pRg st="0" end="0"/>
                                             </p:txEl>
                                           </p:spTgt>
                                         </p:tgtEl>
@@ -10535,7 +10518,7 @@
                                         <p:tgtEl>
                                           <p:spTgt spid="3">
                                             <p:txEl>
-                                              <p:pRg st="4" end="4"/>
+                                              <p:pRg st="2" end="2"/>
                                             </p:txEl>
                                           </p:spTgt>
                                         </p:tgtEl>
@@ -10584,7 +10567,7 @@
                                         <p:tgtEl>
                                           <p:spTgt spid="3">
                                             <p:txEl>
-                                              <p:pRg st="6" end="6"/>
+                                              <p:pRg st="4" end="4"/>
                                             </p:txEl>
                                           </p:spTgt>
                                         </p:tgtEl>
@@ -10599,21 +10582,43 @@
                                   </p:childTnLst>
                                 </p:cTn>
                               </p:par>
+                            </p:childTnLst>
+                          </p:cTn>
+                        </p:par>
+                      </p:childTnLst>
+                    </p:cTn>
+                  </p:par>
+                  <p:par>
+                    <p:cTn id="19" fill="hold">
+                      <p:stCondLst>
+                        <p:cond delay="indefinite"/>
+                      </p:stCondLst>
+                      <p:childTnLst>
+                        <p:par>
+                          <p:cTn id="20" fill="hold">
+                            <p:stCondLst>
+                              <p:cond delay="0"/>
+                            </p:stCondLst>
+                            <p:childTnLst>
                               <p:par>
-                                <p:cTn id="19" presetID="1" presetClass="entr" presetSubtype="0" fill="hold" nodeType="withEffect">
+                                <p:cTn id="21" presetID="1" presetClass="entr" presetSubtype="0" fill="hold" nodeType="clickEffect">
                                   <p:stCondLst>
                                     <p:cond delay="0"/>
                                   </p:stCondLst>
                                   <p:childTnLst>
                                     <p:set>
                                       <p:cBhvr>
-                                        <p:cTn id="20" dur="1" fill="hold">
+                                        <p:cTn id="22" dur="1" fill="hold">
                                           <p:stCondLst>
                                             <p:cond delay="0"/>
                                           </p:stCondLst>
                                         </p:cTn>
                                         <p:tgtEl>
-                                          <p:spTgt spid="4"/>
+                                          <p:spTgt spid="3">
+                                            <p:txEl>
+                                              <p:pRg st="6" end="6"/>
+                                            </p:txEl>
+                                          </p:spTgt>
                                         </p:tgtEl>
                                         <p:attrNameLst>
                                           <p:attrName>style.visibility</p:attrName>

</xml_diff>